<commit_message>
Counting sort using assembly uploaded
</commit_message>
<xml_diff>
--- a/Chapter 8.pptx
+++ b/Chapter 8.pptx
@@ -123,6 +123,22 @@
       </a:defRPr>
     </a:lvl9pPr>
   </p:defaultTextStyle>
+  <p:extLst>
+    <p:ext uri="{EFAFB233-063F-42B5-8137-9DF3F51BA10A}">
+      <p15:sldGuideLst xmlns:p15="http://schemas.microsoft.com/office/powerpoint/2012/main">
+        <p15:guide id="1" orient="horz" pos="2160">
+          <p15:clr>
+            <a:srgbClr val="A4A3A4"/>
+          </p15:clr>
+        </p15:guide>
+        <p15:guide id="2" pos="2880">
+          <p15:clr>
+            <a:srgbClr val="A4A3A4"/>
+          </p15:clr>
+        </p15:guide>
+      </p15:sldGuideLst>
+    </p:ext>
+  </p:extLst>
 </p:presentation>
 </file>
 
@@ -308,7 +324,7 @@
             <a:fld id="{1D8BD707-D9CF-40AE-B4C6-C98DA3205C09}" type="datetimeFigureOut">
               <a:rPr lang="en-US" smtClean="0"/>
               <a:pPr/>
-              <a:t>23-Apr-18</a:t>
+              <a:t>5/6/2018</a:t>
             </a:fld>
             <a:endParaRPr lang="en-US"/>
           </a:p>
@@ -480,7 +496,7 @@
             <a:fld id="{1D8BD707-D9CF-40AE-B4C6-C98DA3205C09}" type="datetimeFigureOut">
               <a:rPr lang="en-US" smtClean="0"/>
               <a:pPr/>
-              <a:t>23-Apr-18</a:t>
+              <a:t>5/6/2018</a:t>
             </a:fld>
             <a:endParaRPr lang="en-US"/>
           </a:p>
@@ -662,7 +678,7 @@
             <a:fld id="{1D8BD707-D9CF-40AE-B4C6-C98DA3205C09}" type="datetimeFigureOut">
               <a:rPr lang="en-US" smtClean="0"/>
               <a:pPr/>
-              <a:t>23-Apr-18</a:t>
+              <a:t>5/6/2018</a:t>
             </a:fld>
             <a:endParaRPr lang="en-US"/>
           </a:p>
@@ -834,7 +850,7 @@
             <a:fld id="{1D8BD707-D9CF-40AE-B4C6-C98DA3205C09}" type="datetimeFigureOut">
               <a:rPr lang="en-US" smtClean="0"/>
               <a:pPr/>
-              <a:t>23-Apr-18</a:t>
+              <a:t>5/6/2018</a:t>
             </a:fld>
             <a:endParaRPr lang="en-US"/>
           </a:p>
@@ -1082,7 +1098,7 @@
             <a:fld id="{1D8BD707-D9CF-40AE-B4C6-C98DA3205C09}" type="datetimeFigureOut">
               <a:rPr lang="en-US" smtClean="0"/>
               <a:pPr/>
-              <a:t>23-Apr-18</a:t>
+              <a:t>5/6/2018</a:t>
             </a:fld>
             <a:endParaRPr lang="en-US"/>
           </a:p>
@@ -1372,7 +1388,7 @@
             <a:fld id="{1D8BD707-D9CF-40AE-B4C6-C98DA3205C09}" type="datetimeFigureOut">
               <a:rPr lang="en-US" smtClean="0"/>
               <a:pPr/>
-              <a:t>23-Apr-18</a:t>
+              <a:t>5/6/2018</a:t>
             </a:fld>
             <a:endParaRPr lang="en-US"/>
           </a:p>
@@ -1796,7 +1812,7 @@
             <a:fld id="{1D8BD707-D9CF-40AE-B4C6-C98DA3205C09}" type="datetimeFigureOut">
               <a:rPr lang="en-US" smtClean="0"/>
               <a:pPr/>
-              <a:t>23-Apr-18</a:t>
+              <a:t>5/6/2018</a:t>
             </a:fld>
             <a:endParaRPr lang="en-US"/>
           </a:p>
@@ -1916,7 +1932,7 @@
             <a:fld id="{1D8BD707-D9CF-40AE-B4C6-C98DA3205C09}" type="datetimeFigureOut">
               <a:rPr lang="en-US" smtClean="0"/>
               <a:pPr/>
-              <a:t>23-Apr-18</a:t>
+              <a:t>5/6/2018</a:t>
             </a:fld>
             <a:endParaRPr lang="en-US"/>
           </a:p>
@@ -2013,7 +2029,7 @@
             <a:fld id="{1D8BD707-D9CF-40AE-B4C6-C98DA3205C09}" type="datetimeFigureOut">
               <a:rPr lang="en-US" smtClean="0"/>
               <a:pPr/>
-              <a:t>23-Apr-18</a:t>
+              <a:t>5/6/2018</a:t>
             </a:fld>
             <a:endParaRPr lang="en-US"/>
           </a:p>
@@ -2292,7 +2308,7 @@
             <a:fld id="{1D8BD707-D9CF-40AE-B4C6-C98DA3205C09}" type="datetimeFigureOut">
               <a:rPr lang="en-US" smtClean="0"/>
               <a:pPr/>
-              <a:t>23-Apr-18</a:t>
+              <a:t>5/6/2018</a:t>
             </a:fld>
             <a:endParaRPr lang="en-US"/>
           </a:p>
@@ -2547,7 +2563,7 @@
             <a:fld id="{1D8BD707-D9CF-40AE-B4C6-C98DA3205C09}" type="datetimeFigureOut">
               <a:rPr lang="en-US" smtClean="0"/>
               <a:pPr/>
-              <a:t>23-Apr-18</a:t>
+              <a:t>5/6/2018</a:t>
             </a:fld>
             <a:endParaRPr lang="en-US"/>
           </a:p>
@@ -2762,7 +2778,7 @@
             <a:fld id="{1D8BD707-D9CF-40AE-B4C6-C98DA3205C09}" type="datetimeFigureOut">
               <a:rPr lang="en-US" smtClean="0"/>
               <a:pPr/>
-              <a:t>23-Apr-18</a:t>
+              <a:t>5/6/2018</a:t>
             </a:fld>
             <a:endParaRPr lang="en-US"/>
           </a:p>
@@ -3171,6 +3187,13 @@
   <p:clrMapOvr>
     <a:masterClrMapping/>
   </p:clrMapOvr>
+  <p:timing>
+    <p:tnLst>
+      <p:par>
+        <p:cTn id="1" dur="indefinite" restart="never" nodeType="tmRoot"/>
+      </p:par>
+    </p:tnLst>
+  </p:timing>
 </p:sld>
 </file>
 
@@ -3500,28 +3523,16 @@
           <a:p>
             <a:r>
               <a:rPr lang="en-US" dirty="0" smtClean="0"/>
-              <a:t>I</a:t>
-            </a:r>
-            <a:r>
-              <a:rPr lang="en-US" dirty="0" smtClean="0"/>
-              <a:t>f </a:t>
-            </a:r>
-            <a:r>
-              <a:rPr lang="en-US" dirty="0" smtClean="0"/>
-              <a:t>type is omitted, NEAR is assumed.</a:t>
-            </a:r>
-          </a:p>
-          <a:p>
-            <a:endParaRPr lang="en-US" dirty="0"/>
-          </a:p>
-          <a:p>
-            <a:r>
-              <a:rPr lang="en-US" dirty="0" smtClean="0"/>
-              <a:t>NEAR </a:t>
-            </a:r>
-            <a:r>
-              <a:rPr lang="en-US" dirty="0" smtClean="0"/>
-              <a:t>means caller and called procedures are in the same segment. </a:t>
+              <a:t>If type is omitted, NEAR is assumed.</a:t>
+            </a:r>
+          </a:p>
+          <a:p>
+            <a:endParaRPr lang="en-US" dirty="0"/>
+          </a:p>
+          <a:p>
+            <a:r>
+              <a:rPr lang="en-US" dirty="0" smtClean="0"/>
+              <a:t>NEAR means caller and called procedures are in the same segment. </a:t>
             </a:r>
             <a:r>
               <a:rPr lang="en-US" dirty="0"/>
@@ -3529,11 +3540,7 @@
             </a:r>
             <a:r>
               <a:rPr lang="en-US" dirty="0" smtClean="0"/>
-              <a:t>ar </a:t>
-            </a:r>
-            <a:r>
-              <a:rPr lang="en-US" dirty="0" smtClean="0"/>
-              <a:t>means caller and called procedures are in different segment.</a:t>
+              <a:t>ar means caller and called procedures are in different segment.</a:t>
             </a:r>
           </a:p>
         </p:txBody>
@@ -4415,6 +4422,13 @@
   <p:clrMapOvr>
     <a:masterClrMapping/>
   </p:clrMapOvr>
+  <p:timing>
+    <p:tnLst>
+      <p:par>
+        <p:cTn id="1" dur="indefinite" restart="never" nodeType="tmRoot"/>
+      </p:par>
+    </p:tnLst>
+  </p:timing>
 </p:sld>
 </file>
 
@@ -4599,24 +4613,16 @@
               <a:buChar char="•"/>
             </a:pPr>
             <a:r>
-              <a:rPr lang="en-US" dirty="0" smtClean="0"/>
-              <a:t>SP register is initialized to </a:t>
-            </a:r>
-            <a:r>
-              <a:rPr lang="en-US" dirty="0" smtClean="0"/>
-              <a:t>100h for the preceding stack declaration. </a:t>
-            </a:r>
-            <a:r>
-              <a:rPr lang="en-US" dirty="0" smtClean="0"/>
-              <a:t>This </a:t>
-            </a:r>
-            <a:r>
-              <a:rPr lang="en-US" dirty="0" smtClean="0"/>
-              <a:t>indicates that the stack is empty. </a:t>
-            </a:r>
-            <a:r>
-              <a:rPr lang="en-US" dirty="0" smtClean="0"/>
-              <a:t>When the stack is not empty, SP contains the offset address of the TOS.</a:t>
+              <a:rPr lang="en-US" dirty="0" smtClean="0">
+                <a:solidFill>
+                  <a:srgbClr val="FF0000"/>
+                </a:solidFill>
+              </a:rPr>
+              <a:t>SP register is initialized to 100h </a:t>
+            </a:r>
+            <a:r>
+              <a:rPr lang="en-US" dirty="0" smtClean="0"/>
+              <a:t>for the preceding stack declaration. This indicates that the stack is empty. When the stack is not empty, SP contains the offset address of the TOS.</a:t>
             </a:r>
             <a:endParaRPr lang="en-US" dirty="0"/>
           </a:p>
@@ -4638,6 +4644,13 @@
   <p:clrMapOvr>
     <a:masterClrMapping/>
   </p:clrMapOvr>
+  <p:timing>
+    <p:tnLst>
+      <p:par>
+        <p:cTn id="1" dur="indefinite" restart="never" nodeType="tmRoot"/>
+      </p:par>
+    </p:tnLst>
+  </p:timing>
 </p:sld>
 </file>
 
@@ -4705,13 +4718,8 @@
           <a:p>
             <a:r>
               <a:rPr lang="en-US" dirty="0" smtClean="0"/>
-              <a:t>PUSH </a:t>
-            </a:r>
-            <a:r>
-              <a:rPr lang="en-US" dirty="0" smtClean="0"/>
-              <a:t>source (e.g. PUSH AX)</a:t>
-            </a:r>
-            <a:endParaRPr lang="en-US" dirty="0" smtClean="0"/>
+              <a:t>PUSH source (e.g. PUSH AX)</a:t>
+            </a:r>
           </a:p>
           <a:p>
             <a:r>
@@ -4729,13 +4737,8 @@
           <a:p>
             <a:r>
               <a:rPr lang="en-US" dirty="0" smtClean="0"/>
-              <a:t>Execution of </a:t>
-            </a:r>
-            <a:r>
-              <a:rPr lang="en-US" dirty="0" smtClean="0"/>
-              <a:t>PUSH causes the following to happen:</a:t>
-            </a:r>
-            <a:endParaRPr lang="en-US" dirty="0" smtClean="0"/>
+              <a:t>Execution of PUSH causes the following to happen:</a:t>
+            </a:r>
           </a:p>
           <a:p>
             <a:pPr marL="285750" indent="-285750">
@@ -4743,7 +4746,11 @@
               <a:buChar char="•"/>
             </a:pPr>
             <a:r>
-              <a:rPr lang="en-US" dirty="0" smtClean="0"/>
+              <a:rPr lang="en-US" dirty="0" smtClean="0">
+                <a:solidFill>
+                  <a:srgbClr val="FF0000"/>
+                </a:solidFill>
+              </a:rPr>
               <a:t>SP is decreased by 2.</a:t>
             </a:r>
           </a:p>
@@ -4753,7 +4760,11 @@
               <a:buChar char="•"/>
             </a:pPr>
             <a:r>
-              <a:rPr lang="en-US" dirty="0" smtClean="0"/>
+              <a:rPr lang="en-US" dirty="0" smtClean="0">
+                <a:solidFill>
+                  <a:srgbClr val="FF0000"/>
+                </a:solidFill>
+              </a:rPr>
               <a:t>A copy of the source content is pushed to the address specified by SS:SP. The source is unchanged</a:t>
             </a:r>
           </a:p>
@@ -4781,7 +4792,6 @@
               <a:rPr lang="en-US" dirty="0" smtClean="0"/>
               <a:t>This instruction pushes the contents of the FLAGS register onto the stack.</a:t>
             </a:r>
-            <a:endParaRPr lang="en-US" dirty="0" smtClean="0"/>
           </a:p>
           <a:p>
             <a:endParaRPr lang="en-US" dirty="0"/>
@@ -4814,22 +4824,13 @@
             </a:r>
             <a:r>
               <a:rPr lang="en-US" dirty="0" smtClean="0"/>
-              <a:t>PUSH </a:t>
-            </a:r>
-            <a:r>
-              <a:rPr lang="en-US" dirty="0" smtClean="0"/>
-              <a:t>DL (Byte instruction is illegal)</a:t>
-            </a:r>
-            <a:endParaRPr lang="en-US" dirty="0" smtClean="0"/>
-          </a:p>
-          <a:p>
-            <a:r>
-              <a:rPr lang="en-US" dirty="0" smtClean="0"/>
-              <a:t>            </a:t>
-            </a:r>
-            <a:r>
-              <a:rPr lang="en-US" dirty="0" smtClean="0"/>
-              <a:t>PUSH 2 (Push of immediate data is illegal)</a:t>
+              <a:t>PUSH DL (Byte instruction is illegal)</a:t>
+            </a:r>
+          </a:p>
+          <a:p>
+            <a:r>
+              <a:rPr lang="en-US" dirty="0" smtClean="0"/>
+              <a:t>            PUSH 2 (Push of immediate data is illegal)</a:t>
             </a:r>
             <a:endParaRPr lang="en-US" dirty="0"/>
           </a:p>
@@ -4857,6 +4858,13 @@
   <p:clrMapOvr>
     <a:masterClrMapping/>
   </p:clrMapOvr>
+  <p:timing>
+    <p:tnLst>
+      <p:par>
+        <p:cTn id="1" dur="indefinite" restart="never" nodeType="tmRoot"/>
+      </p:par>
+    </p:tnLst>
+  </p:timing>
 </p:sld>
 </file>
 
@@ -5278,15 +5286,7 @@
             </a:r>
             <a:r>
               <a:rPr lang="en-US" dirty="0" smtClean="0"/>
-              <a:t>POP/POPF </a:t>
-            </a:r>
-            <a:r>
-              <a:rPr lang="en-US" dirty="0" smtClean="0"/>
-              <a:t>on </a:t>
-            </a:r>
-            <a:r>
-              <a:rPr lang="en-US" dirty="0" smtClean="0"/>
-              <a:t>the flags.</a:t>
+              <a:t>POP/POPF on the flags.</a:t>
             </a:r>
           </a:p>
           <a:p>

</xml_diff>